<commit_message>
Add game_plan and item_list to ppt
</commit_message>
<xml_diff>
--- a/2DGame_Project 1차 발표 PPT(2018184042_장진영).pptx
+++ b/2DGame_Project 1차 발표 PPT(2018184042_장진영).pptx
@@ -5,7 +5,7 @@
     <p:sldMasterId id="2147483768" r:id="rId1"/>
   </p:sldMasterIdLst>
   <p:notesMasterIdLst>
-    <p:notesMasterId r:id="rId9"/>
+    <p:notesMasterId r:id="rId10"/>
   </p:notesMasterIdLst>
   <p:sldIdLst>
     <p:sldId id="256" r:id="rId2"/>
@@ -15,6 +15,7 @@
     <p:sldId id="260" r:id="rId6"/>
     <p:sldId id="261" r:id="rId7"/>
     <p:sldId id="262" r:id="rId8"/>
+    <p:sldId id="263" r:id="rId9"/>
   </p:sldIdLst>
   <p:sldSz cx="9144000" cy="6858000" type="screen4x3"/>
   <p:notesSz cx="6858000" cy="9144000"/>
@@ -5105,11 +5106,7 @@
           <a:p>
             <a:r>
               <a:rPr lang="ko-KR" altLang="en-US" sz="1300" dirty="0" smtClean="0"/>
-              <a:t>●</a:t>
-            </a:r>
-            <a:r>
-              <a:rPr lang="ko-KR" altLang="en-US" sz="1300" dirty="0" smtClean="0"/>
-              <a:t>참고</a:t>
+              <a:t>●참고</a:t>
             </a:r>
             <a:r>
               <a:rPr lang="en-US" altLang="ko-KR" sz="1300" dirty="0"/>
@@ -5301,11 +5298,7 @@
           <a:p>
             <a:r>
               <a:rPr lang="ko-KR" altLang="en-US" sz="1300" dirty="0" smtClean="0"/>
-              <a:t>●</a:t>
-            </a:r>
-            <a:r>
-              <a:rPr lang="ko-KR" altLang="en-US" sz="1300" dirty="0" smtClean="0"/>
-              <a:t>보상</a:t>
+              <a:t>●보상</a:t>
             </a:r>
             <a:r>
               <a:rPr lang="en-US" altLang="ko-KR" sz="1300" dirty="0" smtClean="0"/>
@@ -8058,6 +8051,138 @@
           </a:p>
         </p:txBody>
       </p:sp>
+      <p:grpSp>
+        <p:nvGrpSpPr>
+          <p:cNvPr id="4" name="그룹 3"/>
+          <p:cNvGrpSpPr/>
+          <p:nvPr/>
+        </p:nvGrpSpPr>
+        <p:grpSpPr>
+          <a:xfrm>
+            <a:off x="6905070" y="980728"/>
+            <a:ext cx="2209259" cy="1580953"/>
+            <a:chOff x="6905070" y="980728"/>
+            <a:chExt cx="2209259" cy="1580953"/>
+          </a:xfrm>
+        </p:grpSpPr>
+        <p:sp>
+          <p:nvSpPr>
+            <p:cNvPr id="58" name="직사각형 57"/>
+            <p:cNvSpPr/>
+            <p:nvPr/>
+          </p:nvSpPr>
+          <p:spPr>
+            <a:xfrm>
+              <a:off x="6913209" y="980728"/>
+              <a:ext cx="2123287" cy="1580953"/>
+            </a:xfrm>
+            <a:prstGeom prst="rect">
+              <a:avLst/>
+            </a:prstGeom>
+            <a:solidFill>
+              <a:schemeClr val="bg1"/>
+            </a:solidFill>
+          </p:spPr>
+          <p:style>
+            <a:lnRef idx="2">
+              <a:schemeClr val="accent1">
+                <a:shade val="50000"/>
+              </a:schemeClr>
+            </a:lnRef>
+            <a:fillRef idx="1">
+              <a:schemeClr val="accent1"/>
+            </a:fillRef>
+            <a:effectRef idx="0">
+              <a:schemeClr val="accent1"/>
+            </a:effectRef>
+            <a:fontRef idx="minor">
+              <a:schemeClr val="lt1"/>
+            </a:fontRef>
+          </p:style>
+          <p:txBody>
+            <a:bodyPr rtlCol="0" anchor="ctr"/>
+            <a:lstStyle/>
+            <a:p>
+              <a:pPr algn="ctr"/>
+              <a:endParaRPr lang="ko-KR" altLang="en-US"/>
+            </a:p>
+          </p:txBody>
+        </p:sp>
+        <p:sp>
+          <p:nvSpPr>
+            <p:cNvPr id="3" name="TextBox 2"/>
+            <p:cNvSpPr txBox="1"/>
+            <p:nvPr/>
+          </p:nvSpPr>
+          <p:spPr>
+            <a:xfrm>
+              <a:off x="6905070" y="1135511"/>
+              <a:ext cx="2209259" cy="1200329"/>
+            </a:xfrm>
+            <a:prstGeom prst="rect">
+              <a:avLst/>
+            </a:prstGeom>
+            <a:noFill/>
+          </p:spPr>
+          <p:txBody>
+            <a:bodyPr wrap="none" rtlCol="0">
+              <a:spAutoFit/>
+            </a:bodyPr>
+            <a:lstStyle/>
+            <a:p>
+              <a:r>
+                <a:rPr lang="en-US" altLang="ko-KR" dirty="0" smtClean="0"/>
+                <a:t>[ITEM]</a:t>
+              </a:r>
+            </a:p>
+            <a:p>
+              <a:pPr marL="342900" indent="-342900">
+                <a:buAutoNum type="arabicPeriod"/>
+              </a:pPr>
+              <a:r>
+                <a:rPr lang="en-US" altLang="ko-KR" dirty="0" smtClean="0"/>
+                <a:t>2</a:t>
+              </a:r>
+              <a:r>
+                <a:rPr lang="ko-KR" altLang="en-US" dirty="0" smtClean="0"/>
+                <a:t>초간 무적</a:t>
+              </a:r>
+              <a:endParaRPr lang="en-US" altLang="ko-KR" dirty="0" smtClean="0"/>
+            </a:p>
+            <a:p>
+              <a:pPr marL="342900" indent="-342900">
+                <a:buAutoNum type="arabicPeriod"/>
+              </a:pPr>
+              <a:r>
+                <a:rPr lang="en-US" altLang="ko-KR" dirty="0" smtClean="0"/>
+                <a:t>2</a:t>
+              </a:r>
+              <a:r>
+                <a:rPr lang="ko-KR" altLang="en-US" dirty="0" smtClean="0"/>
+                <a:t>초간 스피드 </a:t>
+              </a:r>
+              <a:r>
+                <a:rPr lang="en-US" altLang="ko-KR" dirty="0" smtClean="0"/>
+                <a:t>UP</a:t>
+              </a:r>
+            </a:p>
+            <a:p>
+              <a:pPr marL="342900" indent="-342900">
+                <a:buAutoNum type="arabicPeriod"/>
+              </a:pPr>
+              <a:r>
+                <a:rPr lang="ko-KR" altLang="en-US" dirty="0" err="1" smtClean="0"/>
+                <a:t>스태미너</a:t>
+              </a:r>
+              <a:r>
+                <a:rPr lang="ko-KR" altLang="en-US" dirty="0" smtClean="0"/>
+                <a:t> 회복</a:t>
+              </a:r>
+              <a:endParaRPr lang="ko-KR" altLang="en-US" dirty="0"/>
+            </a:p>
+          </p:txBody>
+        </p:sp>
+      </p:grpSp>
     </p:spTree>
     <p:extLst>
       <p:ext uri="{BB962C8B-B14F-4D97-AF65-F5344CB8AC3E}">
@@ -8283,6 +8408,51 @@
                                         </p:cTn>
                                         <p:tgtEl>
                                           <p:spTgt spid="51"/>
+                                        </p:tgtEl>
+                                        <p:attrNameLst>
+                                          <p:attrName>style.visibility</p:attrName>
+                                        </p:attrNameLst>
+                                      </p:cBhvr>
+                                      <p:to>
+                                        <p:strVal val="visible"/>
+                                      </p:to>
+                                    </p:set>
+                                  </p:childTnLst>
+                                </p:cTn>
+                              </p:par>
+                            </p:childTnLst>
+                          </p:cTn>
+                        </p:par>
+                      </p:childTnLst>
+                    </p:cTn>
+                  </p:par>
+                  <p:par>
+                    <p:cTn id="23" fill="hold">
+                      <p:stCondLst>
+                        <p:cond delay="indefinite"/>
+                      </p:stCondLst>
+                      <p:childTnLst>
+                        <p:par>
+                          <p:cTn id="24" fill="hold">
+                            <p:stCondLst>
+                              <p:cond delay="0"/>
+                            </p:stCondLst>
+                            <p:childTnLst>
+                              <p:par>
+                                <p:cTn id="25" presetID="1" presetClass="entr" presetSubtype="0" fill="hold" nodeType="clickEffect">
+                                  <p:stCondLst>
+                                    <p:cond delay="0"/>
+                                  </p:stCondLst>
+                                  <p:childTnLst>
+                                    <p:set>
+                                      <p:cBhvr>
+                                        <p:cTn id="26" dur="1" fill="hold">
+                                          <p:stCondLst>
+                                            <p:cond delay="0"/>
+                                          </p:stCondLst>
+                                        </p:cTn>
+                                        <p:tgtEl>
+                                          <p:spTgt spid="4"/>
                                         </p:tgtEl>
                                         <p:attrNameLst>
                                           <p:attrName>style.visibility</p:attrName>
@@ -9632,6 +9802,375 @@
     <p:extLst>
       <p:ext uri="{BB962C8B-B14F-4D97-AF65-F5344CB8AC3E}">
         <p14:creationId xmlns:p14="http://schemas.microsoft.com/office/powerpoint/2010/main" val="1136511350"/>
+      </p:ext>
+    </p:extLst>
+  </p:cSld>
+  <p:clrMapOvr>
+    <a:masterClrMapping/>
+  </p:clrMapOvr>
+  <p:timing>
+    <p:tnLst>
+      <p:par>
+        <p:cTn id="1" dur="indefinite" restart="never" nodeType="tmRoot"/>
+      </p:par>
+    </p:tnLst>
+  </p:timing>
+</p:sld>
+</file>
+
+<file path=ppt/slides/slide8.xml><?xml version="1.0" encoding="utf-8"?>
+<p:sld xmlns:a="http://schemas.openxmlformats.org/drawingml/2006/main" xmlns:r="http://schemas.openxmlformats.org/officeDocument/2006/relationships" xmlns:p="http://schemas.openxmlformats.org/presentationml/2006/main">
+  <p:cSld>
+    <p:spTree>
+      <p:nvGrpSpPr>
+        <p:cNvPr id="1" name=""/>
+        <p:cNvGrpSpPr/>
+        <p:nvPr/>
+      </p:nvGrpSpPr>
+      <p:grpSpPr>
+        <a:xfrm>
+          <a:off x="0" y="0"/>
+          <a:ext cx="0" cy="0"/>
+          <a:chOff x="0" y="0"/>
+          <a:chExt cx="0" cy="0"/>
+        </a:xfrm>
+      </p:grpSpPr>
+      <p:sp>
+        <p:nvSpPr>
+          <p:cNvPr id="4" name="제목 1"/>
+          <p:cNvSpPr txBox="1">
+            <a:spLocks/>
+          </p:cNvSpPr>
+          <p:nvPr/>
+        </p:nvSpPr>
+        <p:spPr>
+          <a:xfrm>
+            <a:off x="1340024" y="427038"/>
+            <a:ext cx="7498080" cy="1143000"/>
+          </a:xfrm>
+          <a:prstGeom prst="rect">
+            <a:avLst/>
+          </a:prstGeom>
+        </p:spPr>
+        <p:txBody>
+          <a:bodyPr anchor="ctr">
+            <a:normAutofit/>
+          </a:bodyPr>
+          <a:lstStyle>
+            <a:lvl1pPr algn="l" rtl="0" eaLnBrk="1" latinLnBrk="1" hangingPunct="1">
+              <a:spcBef>
+                <a:spcPct val="0"/>
+              </a:spcBef>
+              <a:buNone/>
+              <a:defRPr kumimoji="0" sz="4300" kern="1200">
+                <a:solidFill>
+                  <a:schemeClr val="tx2">
+                    <a:satMod val="130000"/>
+                  </a:schemeClr>
+                </a:solidFill>
+                <a:effectLst>
+                  <a:outerShdw blurRad="50000" dist="30000" dir="5400000" algn="tl" rotWithShape="0">
+                    <a:srgbClr val="000000">
+                      <a:alpha val="30000"/>
+                    </a:srgbClr>
+                  </a:outerShdw>
+                </a:effectLst>
+                <a:latin typeface="+mj-lt"/>
+                <a:ea typeface="+mj-ea"/>
+                <a:cs typeface="+mj-cs"/>
+              </a:defRPr>
+            </a:lvl1pPr>
+            <a:extLst/>
+          </a:lstStyle>
+          <a:p>
+            <a:r>
+              <a:rPr lang="ko-KR" altLang="en-US" dirty="0" smtClean="0"/>
+              <a:t>게임 기획</a:t>
+            </a:r>
+            <a:endParaRPr lang="ko-KR" altLang="en-US" dirty="0"/>
+          </a:p>
+        </p:txBody>
+      </p:sp>
+      <p:sp>
+        <p:nvSpPr>
+          <p:cNvPr id="6" name="TextBox 5"/>
+          <p:cNvSpPr txBox="1"/>
+          <p:nvPr/>
+        </p:nvSpPr>
+        <p:spPr>
+          <a:xfrm>
+            <a:off x="1363291" y="1385372"/>
+            <a:ext cx="7780709" cy="5078313"/>
+          </a:xfrm>
+          <a:prstGeom prst="rect">
+            <a:avLst/>
+          </a:prstGeom>
+          <a:noFill/>
+        </p:spPr>
+        <p:txBody>
+          <a:bodyPr wrap="square" rtlCol="0">
+            <a:spAutoFit/>
+          </a:bodyPr>
+          <a:lstStyle/>
+          <a:p>
+            <a:pPr marL="342900" indent="-342900">
+              <a:buAutoNum type="arabicPeriod"/>
+            </a:pPr>
+            <a:r>
+              <a:rPr lang="ko-KR" altLang="en-US" dirty="0" smtClean="0"/>
+              <a:t>수영</a:t>
+            </a:r>
+            <a:r>
+              <a:rPr lang="en-US" altLang="ko-KR" dirty="0" smtClean="0"/>
+              <a:t>  </a:t>
+            </a:r>
+            <a:r>
+              <a:rPr lang="en-US" altLang="ko-KR" dirty="0"/>
+              <a:t>2. </a:t>
+            </a:r>
+            <a:r>
+              <a:rPr lang="ko-KR" altLang="en-US" dirty="0"/>
+              <a:t>자전거  </a:t>
+            </a:r>
+            <a:r>
+              <a:rPr lang="en-US" altLang="ko-KR" dirty="0"/>
+              <a:t>3. </a:t>
+            </a:r>
+            <a:r>
+              <a:rPr lang="ko-KR" altLang="en-US" dirty="0" smtClean="0"/>
+              <a:t>달리기 </a:t>
+            </a:r>
+            <a:r>
+              <a:rPr lang="en-US" altLang="ko-KR" dirty="0" smtClean="0"/>
+              <a:t>/ /</a:t>
+            </a:r>
+            <a:r>
+              <a:rPr lang="ko-KR" altLang="en-US" dirty="0"/>
+              <a:t>게임은 세 가지 단계로 이루어져 있다</a:t>
+            </a:r>
+            <a:r>
+              <a:rPr lang="en-US" altLang="ko-KR" dirty="0" smtClean="0"/>
+              <a:t>.</a:t>
+            </a:r>
+          </a:p>
+          <a:p>
+            <a:pPr marL="342900" indent="-342900">
+              <a:buAutoNum type="arabicPeriod"/>
+            </a:pPr>
+            <a:endParaRPr lang="en-US" altLang="ko-KR" dirty="0" smtClean="0"/>
+          </a:p>
+          <a:p>
+            <a:r>
+              <a:rPr lang="en-US" altLang="ko-KR" dirty="0" smtClean="0"/>
+              <a:t>- </a:t>
+            </a:r>
+            <a:r>
+              <a:rPr lang="ko-KR" altLang="en-US" dirty="0" smtClean="0"/>
+              <a:t>수영에는 악어나 상어 같은 장애물들이 규칙성을 갖고 돌아다닌다</a:t>
+            </a:r>
+            <a:r>
+              <a:rPr lang="en-US" altLang="ko-KR" dirty="0" smtClean="0"/>
+              <a:t>.</a:t>
+            </a:r>
+          </a:p>
+          <a:p>
+            <a:endParaRPr lang="en-US" altLang="ko-KR" dirty="0"/>
+          </a:p>
+          <a:p>
+            <a:r>
+              <a:rPr lang="en-US" altLang="ko-KR" dirty="0" smtClean="0"/>
+              <a:t>- </a:t>
+            </a:r>
+            <a:r>
+              <a:rPr lang="ko-KR" altLang="en-US" dirty="0" smtClean="0"/>
+              <a:t>자전거는 바닥에서 가시가 올라오고 바위가 굴러 떨어진다</a:t>
+            </a:r>
+            <a:r>
+              <a:rPr lang="en-US" altLang="ko-KR" dirty="0" smtClean="0"/>
+              <a:t>.</a:t>
+            </a:r>
+          </a:p>
+          <a:p>
+            <a:endParaRPr lang="en-US" altLang="ko-KR" dirty="0"/>
+          </a:p>
+          <a:p>
+            <a:r>
+              <a:rPr lang="en-US" altLang="ko-KR" dirty="0" smtClean="0"/>
+              <a:t>- </a:t>
+            </a:r>
+            <a:r>
+              <a:rPr lang="ko-KR" altLang="en-US" dirty="0" smtClean="0"/>
+              <a:t>달리기는 </a:t>
+            </a:r>
+            <a:r>
+              <a:rPr lang="ko-KR" altLang="en-US" dirty="0" err="1" smtClean="0"/>
+              <a:t>좀비들을</a:t>
+            </a:r>
+            <a:r>
+              <a:rPr lang="ko-KR" altLang="en-US" dirty="0" smtClean="0"/>
+              <a:t> 피해야 하는데 플레이어가 일정 거리에 있다면</a:t>
+            </a:r>
+            <a:endParaRPr lang="en-US" altLang="ko-KR" dirty="0" smtClean="0"/>
+          </a:p>
+          <a:p>
+            <a:r>
+              <a:rPr lang="en-US" altLang="ko-KR" dirty="0" smtClean="0"/>
+              <a:t>  </a:t>
+            </a:r>
+            <a:r>
+              <a:rPr lang="ko-KR" altLang="en-US" dirty="0" smtClean="0"/>
+              <a:t>따라온다</a:t>
+            </a:r>
+            <a:r>
+              <a:rPr lang="en-US" altLang="ko-KR" dirty="0" smtClean="0"/>
+              <a:t>.</a:t>
+            </a:r>
+          </a:p>
+          <a:p>
+            <a:endParaRPr lang="en-US" altLang="ko-KR" dirty="0"/>
+          </a:p>
+          <a:p>
+            <a:r>
+              <a:rPr lang="ko-KR" altLang="en-US" dirty="0" smtClean="0"/>
+              <a:t>각 단계를 무사히 마쳐야 랭킹 보드에 기록을 올릴 수 있고</a:t>
+            </a:r>
+            <a:endParaRPr lang="en-US" altLang="ko-KR" dirty="0"/>
+          </a:p>
+          <a:p>
+            <a:r>
+              <a:rPr lang="ko-KR" altLang="en-US" dirty="0" smtClean="0"/>
+              <a:t>랭킹 보드에는 각 단계별 시간과 시간의 총 합이 올라간다</a:t>
+            </a:r>
+            <a:r>
+              <a:rPr lang="en-US" altLang="ko-KR" dirty="0" smtClean="0"/>
+              <a:t>.  </a:t>
+            </a:r>
+          </a:p>
+          <a:p>
+            <a:endParaRPr lang="en-US" altLang="ko-KR" dirty="0"/>
+          </a:p>
+          <a:p>
+            <a:r>
+              <a:rPr lang="ko-KR" altLang="en-US" dirty="0" err="1" smtClean="0"/>
+              <a:t>스태미너</a:t>
+            </a:r>
+            <a:r>
+              <a:rPr lang="en-US" altLang="ko-KR" dirty="0" smtClean="0"/>
+              <a:t>: </a:t>
+            </a:r>
+            <a:r>
+              <a:rPr lang="ko-KR" altLang="en-US" dirty="0" smtClean="0"/>
+              <a:t>플레이어는 </a:t>
+            </a:r>
+            <a:r>
+              <a:rPr lang="en-US" altLang="ko-KR" dirty="0" smtClean="0"/>
+              <a:t>shift</a:t>
+            </a:r>
+            <a:r>
+              <a:rPr lang="ko-KR" altLang="en-US" dirty="0" smtClean="0"/>
+              <a:t>키를 눌러서 캐릭터의 속도를 증가시킬 수 </a:t>
+            </a:r>
+            <a:endParaRPr lang="en-US" altLang="ko-KR" dirty="0"/>
+          </a:p>
+          <a:p>
+            <a:r>
+              <a:rPr lang="ko-KR" altLang="en-US" dirty="0" smtClean="0"/>
+              <a:t>있다</a:t>
+            </a:r>
+            <a:r>
+              <a:rPr lang="en-US" altLang="ko-KR" dirty="0" smtClean="0"/>
+              <a:t>. </a:t>
+            </a:r>
+            <a:r>
+              <a:rPr lang="ko-KR" altLang="en-US" dirty="0" smtClean="0"/>
+              <a:t>그러면 </a:t>
+            </a:r>
+            <a:r>
+              <a:rPr lang="ko-KR" altLang="en-US" dirty="0" err="1" smtClean="0"/>
+              <a:t>스태미너가</a:t>
+            </a:r>
+            <a:r>
+              <a:rPr lang="ko-KR" altLang="en-US" dirty="0" smtClean="0"/>
+              <a:t> 감소하게 되고 </a:t>
+            </a:r>
+            <a:r>
+              <a:rPr lang="ko-KR" altLang="en-US" dirty="0" err="1" smtClean="0"/>
+              <a:t>스태미너를</a:t>
+            </a:r>
+            <a:r>
+              <a:rPr lang="ko-KR" altLang="en-US" dirty="0" smtClean="0"/>
+              <a:t> 모두 소진하면 캐릭터가 </a:t>
+            </a:r>
+            <a:r>
+              <a:rPr lang="ko-KR" altLang="en-US" dirty="0" err="1" smtClean="0"/>
+              <a:t>몇초간</a:t>
+            </a:r>
+            <a:r>
+              <a:rPr lang="ko-KR" altLang="en-US" dirty="0" smtClean="0"/>
+              <a:t> 그로기 상태에 걸린다</a:t>
+            </a:r>
+            <a:r>
+              <a:rPr lang="en-US" altLang="ko-KR" dirty="0" smtClean="0"/>
+              <a:t>.</a:t>
+            </a:r>
+          </a:p>
+          <a:p>
+            <a:endParaRPr lang="en-US" altLang="ko-KR" dirty="0"/>
+          </a:p>
+          <a:p>
+            <a:r>
+              <a:rPr lang="ko-KR" altLang="en-US" dirty="0" smtClean="0"/>
+              <a:t>아이템</a:t>
+            </a:r>
+            <a:r>
+              <a:rPr lang="en-US" altLang="ko-KR" dirty="0" smtClean="0"/>
+              <a:t>: </a:t>
+            </a:r>
+            <a:r>
+              <a:rPr lang="ko-KR" altLang="en-US" dirty="0" smtClean="0"/>
+              <a:t>게임 도중 아이템이 있을 수 있는데 </a:t>
+            </a:r>
+            <a:r>
+              <a:rPr lang="en-US" altLang="ko-KR" dirty="0" smtClean="0"/>
+              <a:t>2</a:t>
+            </a:r>
+            <a:r>
+              <a:rPr lang="ko-KR" altLang="en-US" dirty="0" smtClean="0"/>
+              <a:t>초간 무적 상태 아이템</a:t>
+            </a:r>
+            <a:r>
+              <a:rPr lang="en-US" altLang="ko-KR" dirty="0" smtClean="0"/>
+              <a:t>, </a:t>
+            </a:r>
+          </a:p>
+          <a:p>
+            <a:r>
+              <a:rPr lang="ko-KR" altLang="en-US" dirty="0" smtClean="0"/>
+              <a:t>스피드 증가 아이템</a:t>
+            </a:r>
+            <a:r>
+              <a:rPr lang="en-US" altLang="ko-KR" dirty="0" smtClean="0"/>
+              <a:t>, </a:t>
+            </a:r>
+            <a:r>
+              <a:rPr lang="ko-KR" altLang="en-US" dirty="0" err="1" smtClean="0"/>
+              <a:t>스테미너</a:t>
+            </a:r>
+            <a:r>
+              <a:rPr lang="ko-KR" altLang="en-US" dirty="0" smtClean="0"/>
+              <a:t> 회복 아이템이 있다</a:t>
+            </a:r>
+            <a:r>
+              <a:rPr lang="en-US" altLang="ko-KR" dirty="0" smtClean="0"/>
+              <a:t>.  </a:t>
+            </a:r>
+          </a:p>
+        </p:txBody>
+      </p:sp>
+    </p:spTree>
+    <p:extLst>
+      <p:ext uri="{BB962C8B-B14F-4D97-AF65-F5344CB8AC3E}">
+        <p14:creationId xmlns:p14="http://schemas.microsoft.com/office/powerpoint/2010/main" val="363014964"/>
       </p:ext>
     </p:extLst>
   </p:cSld>

</xml_diff>